<commit_message>
Added presentation in pdf form
</commit_message>
<xml_diff>
--- a/admin/weekly-updates/week3/Week3.pptx
+++ b/admin/weekly-updates/week3/Week3.pptx
@@ -113,6 +113,11 @@
       </a:defRPr>
     </a:lvl9pPr>
   </p:defaultTextStyle>
+  <p:extLst>
+    <p:ext uri="{EFAFB233-063F-42B5-8137-9DF3F51BA10A}">
+      <p15:sldGuideLst xmlns:p15="http://schemas.microsoft.com/office/powerpoint/2012/main"/>
+    </p:ext>
+  </p:extLst>
 </p:presentation>
 </file>
 
@@ -4190,7 +4195,7 @@
         </p:nvSpPr>
         <p:spPr>
           <a:xfrm>
-            <a:off x="4971415" y="4752757"/>
+            <a:off x="6862634" y="4763393"/>
             <a:ext cx="3045534" cy="1200329"/>
           </a:xfrm>
           <a:prstGeom prst="rect">
@@ -4333,19 +4338,7 @@
               <a:rPr lang="en-US" dirty="0">
                 <a:latin typeface="Bradley Hand" pitchFamily="2" charset="77"/>
               </a:rPr>
-              <a:t> Brief Overview about the code we are doing is explained using </a:t>
-            </a:r>
-            <a:r>
-              <a:rPr lang="en-US" dirty="0" err="1">
-                <a:latin typeface="Bradley Hand" pitchFamily="2" charset="77"/>
-              </a:rPr>
-              <a:t>jupyter</a:t>
-            </a:r>
-            <a:r>
-              <a:rPr lang="en-US" dirty="0">
-                <a:latin typeface="Bradley Hand" pitchFamily="2" charset="77"/>
-              </a:rPr>
-              <a:t> notebook</a:t>
+              <a:t> Brief Overview about the code we are doing is explained using jupyter notebook</a:t>
             </a:r>
           </a:p>
           <a:p>

</xml_diff>

<commit_message>
Modified the typo in presentation
</commit_message>
<xml_diff>
--- a/admin/weekly-updates/week3/Week3.pptx
+++ b/admin/weekly-updates/week3/Week3.pptx
@@ -275,7 +275,7 @@
           <a:p>
             <a:fld id="{11EAACC7-3B3F-47D1-959A-EF58926E955E}" type="datetimeFigureOut">
               <a:rPr lang="en-US" smtClean="0"/>
-              <a:t>5/20/22</a:t>
+              <a:t>5/24/22</a:t>
             </a:fld>
             <a:endParaRPr lang="en-US"/>
           </a:p>
@@ -473,7 +473,7 @@
           <a:p>
             <a:fld id="{11EAACC7-3B3F-47D1-959A-EF58926E955E}" type="datetimeFigureOut">
               <a:rPr lang="en-US" smtClean="0"/>
-              <a:t>5/20/22</a:t>
+              <a:t>5/24/22</a:t>
             </a:fld>
             <a:endParaRPr lang="en-US"/>
           </a:p>
@@ -681,7 +681,7 @@
           <a:p>
             <a:fld id="{11EAACC7-3B3F-47D1-959A-EF58926E955E}" type="datetimeFigureOut">
               <a:rPr lang="en-US" smtClean="0"/>
-              <a:t>5/20/22</a:t>
+              <a:t>5/24/22</a:t>
             </a:fld>
             <a:endParaRPr lang="en-US"/>
           </a:p>
@@ -910,7 +910,7 @@
           <a:p>
             <a:fld id="{11EAACC7-3B3F-47D1-959A-EF58926E955E}" type="datetimeFigureOut">
               <a:rPr lang="en-US" smtClean="0"/>
-              <a:t>5/20/22</a:t>
+              <a:t>5/24/22</a:t>
             </a:fld>
             <a:endParaRPr lang="en-US" dirty="0"/>
           </a:p>
@@ -1185,7 +1185,7 @@
           <a:p>
             <a:fld id="{11EAACC7-3B3F-47D1-959A-EF58926E955E}" type="datetimeFigureOut">
               <a:rPr lang="en-US" smtClean="0"/>
-              <a:t>5/20/22</a:t>
+              <a:t>5/24/22</a:t>
             </a:fld>
             <a:endParaRPr lang="en-US"/>
           </a:p>
@@ -1451,7 +1451,7 @@
           <a:p>
             <a:fld id="{11EAACC7-3B3F-47D1-959A-EF58926E955E}" type="datetimeFigureOut">
               <a:rPr lang="en-US" smtClean="0"/>
-              <a:t>5/20/22</a:t>
+              <a:t>5/24/22</a:t>
             </a:fld>
             <a:endParaRPr lang="en-US"/>
           </a:p>
@@ -1868,7 +1868,7 @@
           <a:p>
             <a:fld id="{11EAACC7-3B3F-47D1-959A-EF58926E955E}" type="datetimeFigureOut">
               <a:rPr lang="en-US" smtClean="0"/>
-              <a:t>5/20/22</a:t>
+              <a:t>5/24/22</a:t>
             </a:fld>
             <a:endParaRPr lang="en-US"/>
           </a:p>
@@ -2009,7 +2009,7 @@
           <a:p>
             <a:fld id="{11EAACC7-3B3F-47D1-959A-EF58926E955E}" type="datetimeFigureOut">
               <a:rPr lang="en-US" smtClean="0"/>
-              <a:t>5/20/22</a:t>
+              <a:t>5/24/22</a:t>
             </a:fld>
             <a:endParaRPr lang="en-US"/>
           </a:p>
@@ -2122,7 +2122,7 @@
           <a:p>
             <a:fld id="{11EAACC7-3B3F-47D1-959A-EF58926E955E}" type="datetimeFigureOut">
               <a:rPr lang="en-US" smtClean="0"/>
-              <a:t>5/20/22</a:t>
+              <a:t>5/24/22</a:t>
             </a:fld>
             <a:endParaRPr lang="en-US"/>
           </a:p>
@@ -2433,7 +2433,7 @@
           <a:p>
             <a:fld id="{11EAACC7-3B3F-47D1-959A-EF58926E955E}" type="datetimeFigureOut">
               <a:rPr lang="en-US" smtClean="0"/>
-              <a:t>5/20/22</a:t>
+              <a:t>5/24/22</a:t>
             </a:fld>
             <a:endParaRPr lang="en-US"/>
           </a:p>
@@ -2724,7 +2724,7 @@
           <a:p>
             <a:fld id="{11EAACC7-3B3F-47D1-959A-EF58926E955E}" type="datetimeFigureOut">
               <a:rPr lang="en-US" smtClean="0"/>
-              <a:t>5/20/22</a:t>
+              <a:t>5/24/22</a:t>
             </a:fld>
             <a:endParaRPr lang="en-US"/>
           </a:p>
@@ -3281,7 +3281,7 @@
           <a:p>
             <a:fld id="{11EAACC7-3B3F-47D1-959A-EF58926E955E}" type="datetimeFigureOut">
               <a:rPr lang="en-US" smtClean="0"/>
-              <a:t>5/20/22</a:t>
+              <a:t>5/24/22</a:t>
             </a:fld>
             <a:endParaRPr lang="en-US"/>
           </a:p>
@@ -5858,8 +5858,17 @@
               <a:rPr lang="en-US" dirty="0">
                 <a:latin typeface="Bradley Hand" pitchFamily="2" charset="77"/>
               </a:rPr>
-              <a:t>Timings for work: Monday to Friday,  9:30 AM – 5: 30 AM</a:t>
-            </a:r>
+              <a:t>Timings for work: Monday to Friday,  9:30 AM – 5: </a:t>
+            </a:r>
+            <a:r>
+              <a:rPr lang="en-US">
+                <a:latin typeface="Bradley Hand" pitchFamily="2" charset="77"/>
+              </a:rPr>
+              <a:t>30 PM</a:t>
+            </a:r>
+            <a:endParaRPr lang="en-US" dirty="0">
+              <a:latin typeface="Bradley Hand" pitchFamily="2" charset="77"/>
+            </a:endParaRPr>
           </a:p>
         </p:txBody>
       </p:sp>

</xml_diff>